<commit_message>
renamed a picture and updated presentation
</commit_message>
<xml_diff>
--- a/Presentation_Case_Study_3.pptx
+++ b/Presentation_Case_Study_3.pptx
@@ -5,10 +5,10 @@
     <p:sldMasterId id="2147483648" r:id="rId1"/>
   </p:sldMasterIdLst>
   <p:notesMasterIdLst>
-    <p:notesMasterId r:id="rId8"/>
+    <p:notesMasterId r:id="rId9"/>
   </p:notesMasterIdLst>
   <p:handoutMasterIdLst>
-    <p:handoutMasterId r:id="rId9"/>
+    <p:handoutMasterId r:id="rId10"/>
   </p:handoutMasterIdLst>
   <p:sldIdLst>
     <p:sldId id="307" r:id="rId2"/>
@@ -17,6 +17,7 @@
     <p:sldId id="341" r:id="rId5"/>
     <p:sldId id="339" r:id="rId6"/>
     <p:sldId id="340" r:id="rId7"/>
+    <p:sldId id="342" r:id="rId8"/>
   </p:sldIdLst>
   <p:sldSz cx="9144000" cy="6858000" type="screen4x3"/>
   <p:notesSz cx="7099300" cy="10234613"/>
@@ -156,6 +157,7 @@
             <p14:sldId id="341"/>
             <p14:sldId id="339"/>
             <p14:sldId id="340"/>
+            <p14:sldId id="342"/>
           </p14:sldIdLst>
         </p14:section>
       </p14:sectionLst>
@@ -402,7 +404,7 @@
               <a:pPr>
                 <a:defRPr/>
               </a:pPr>
-              <a:t>‹Nr.›</a:t>
+              <a:t>‹#›</a:t>
             </a:fld>
             <a:endParaRPr lang="en-GB"/>
           </a:p>
@@ -735,7 +737,7 @@
               <a:pPr>
                 <a:defRPr/>
               </a:pPr>
-              <a:t>‹Nr.›</a:t>
+              <a:t>‹#›</a:t>
             </a:fld>
             <a:endParaRPr lang="en-US"/>
           </a:p>
@@ -1069,7 +1071,7 @@
               <a:pPr>
                 <a:defRPr/>
               </a:pPr>
-              <a:t>‹Nr.›</a:t>
+              <a:t>‹#›</a:t>
             </a:fld>
             <a:endParaRPr lang="en-GB"/>
           </a:p>
@@ -1265,7 +1267,7 @@
               <a:pPr>
                 <a:defRPr/>
               </a:pPr>
-              <a:t>‹Nr.›</a:t>
+              <a:t>‹#›</a:t>
             </a:fld>
             <a:endParaRPr lang="en-GB"/>
           </a:p>
@@ -1471,7 +1473,7 @@
               <a:pPr>
                 <a:defRPr/>
               </a:pPr>
-              <a:t>‹Nr.›</a:t>
+              <a:t>‹#›</a:t>
             </a:fld>
             <a:endParaRPr lang="en-GB"/>
           </a:p>
@@ -1667,7 +1669,7 @@
               <a:pPr>
                 <a:defRPr/>
               </a:pPr>
-              <a:t>‹Nr.›</a:t>
+              <a:t>‹#›</a:t>
             </a:fld>
             <a:endParaRPr lang="en-GB"/>
           </a:p>
@@ -1885,7 +1887,7 @@
               <a:pPr>
                 <a:defRPr/>
               </a:pPr>
-              <a:t>‹Nr.›</a:t>
+              <a:t>‹#›</a:t>
             </a:fld>
             <a:endParaRPr lang="en-GB"/>
           </a:p>
@@ -2199,7 +2201,7 @@
               <a:pPr>
                 <a:defRPr/>
               </a:pPr>
-              <a:t>‹Nr.›</a:t>
+              <a:t>‹#›</a:t>
             </a:fld>
             <a:endParaRPr lang="en-GB"/>
           </a:p>
@@ -2647,7 +2649,7 @@
               <a:pPr>
                 <a:defRPr/>
               </a:pPr>
-              <a:t>‹Nr.›</a:t>
+              <a:t>‹#›</a:t>
             </a:fld>
             <a:endParaRPr lang="en-GB"/>
           </a:p>
@@ -2791,7 +2793,7 @@
               <a:pPr>
                 <a:defRPr/>
               </a:pPr>
-              <a:t>‹Nr.›</a:t>
+              <a:t>‹#›</a:t>
             </a:fld>
             <a:endParaRPr lang="en-GB"/>
           </a:p>
@@ -2912,7 +2914,7 @@
               <a:pPr>
                 <a:defRPr/>
               </a:pPr>
-              <a:t>‹Nr.›</a:t>
+              <a:t>‹#›</a:t>
             </a:fld>
             <a:endParaRPr lang="en-GB"/>
           </a:p>
@@ -3215,7 +3217,7 @@
               <a:pPr>
                 <a:defRPr/>
               </a:pPr>
-              <a:t>‹Nr.›</a:t>
+              <a:t>‹#›</a:t>
             </a:fld>
             <a:endParaRPr lang="en-GB"/>
           </a:p>
@@ -3495,7 +3497,7 @@
               <a:pPr>
                 <a:defRPr/>
               </a:pPr>
-              <a:t>‹Nr.›</a:t>
+              <a:t>‹#›</a:t>
             </a:fld>
             <a:endParaRPr lang="en-GB"/>
           </a:p>
@@ -3822,7 +3824,7 @@
               <a:pPr>
                 <a:defRPr/>
               </a:pPr>
-              <a:t>‹Nr.›</a:t>
+              <a:t>‹#›</a:t>
             </a:fld>
             <a:endParaRPr lang="en-GB"/>
           </a:p>
@@ -6099,13 +6101,7 @@
       </p:sp>
       <p:pic>
         <p:nvPicPr>
-          <p:cNvPr id="32" name="Grafik 31">
-            <a:extLst>
-              <a:ext uri="{FF2B5EF4-FFF2-40B4-BE49-F238E27FC236}">
-                <a16:creationId xmlns:a16="http://schemas.microsoft.com/office/drawing/2014/main" id="{80C09496-241B-4AAF-9E63-5AD0FE7D6D8C}"/>
-              </a:ext>
-            </a:extLst>
-          </p:cNvPr>
+          <p:cNvPr id="17" name="Picture 16"/>
           <p:cNvPicPr>
             <a:picLocks noChangeAspect="1"/>
           </p:cNvPicPr>
@@ -6129,8 +6125,8 @@
         </p:blipFill>
         <p:spPr>
           <a:xfrm>
-            <a:off x="1390017" y="1526343"/>
-            <a:ext cx="7369624" cy="2064001"/>
+            <a:off x="1390017" y="1526336"/>
+            <a:ext cx="7369843" cy="2066046"/>
           </a:xfrm>
           <a:prstGeom prst="rect">
             <a:avLst/>
@@ -6227,6 +6223,13 @@
   <p:clrMapOvr>
     <a:masterClrMapping/>
   </p:clrMapOvr>
+  <p:timing>
+    <p:tnLst>
+      <p:par>
+        <p:cTn id="1" dur="indefinite" restart="never" nodeType="tmRoot"/>
+      </p:par>
+    </p:tnLst>
+  </p:timing>
 </p:sld>
 </file>
 
@@ -10790,13 +10793,7 @@
       </p:sp>
       <p:pic>
         <p:nvPicPr>
-          <p:cNvPr id="3" name="Grafik 2">
-            <a:extLst>
-              <a:ext uri="{FF2B5EF4-FFF2-40B4-BE49-F238E27FC236}">
-                <a16:creationId xmlns:a16="http://schemas.microsoft.com/office/drawing/2014/main" id="{E5A80872-106F-486D-92B8-4E446E0D3C0F}"/>
-              </a:ext>
-            </a:extLst>
-          </p:cNvPr>
+          <p:cNvPr id="2" name="Picture 1"/>
           <p:cNvPicPr>
             <a:picLocks noChangeAspect="1"/>
           </p:cNvPicPr>
@@ -10820,8 +10817,8 @@
         </p:blipFill>
         <p:spPr>
           <a:xfrm>
-            <a:off x="1404519" y="1568013"/>
-            <a:ext cx="7205731" cy="4112180"/>
+            <a:off x="1404321" y="1402814"/>
+            <a:ext cx="7206128" cy="4723459"/>
           </a:xfrm>
           <a:prstGeom prst="rect">
             <a:avLst/>
@@ -10838,6 +10835,13 @@
   <p:clrMapOvr>
     <a:masterClrMapping/>
   </p:clrMapOvr>
+  <p:timing>
+    <p:tnLst>
+      <p:par>
+        <p:cTn id="1" dur="indefinite" restart="never" nodeType="tmRoot"/>
+      </p:par>
+    </p:tnLst>
+  </p:timing>
 </p:sld>
 </file>
 
@@ -12271,13 +12275,7 @@
       </p:sp>
       <p:pic>
         <p:nvPicPr>
-          <p:cNvPr id="50" name="Grafik 49">
-            <a:extLst>
-              <a:ext uri="{FF2B5EF4-FFF2-40B4-BE49-F238E27FC236}">
-                <a16:creationId xmlns:a16="http://schemas.microsoft.com/office/drawing/2014/main" id="{92353CB8-4865-4390-B732-7686F8B4DEC0}"/>
-              </a:ext>
-            </a:extLst>
-          </p:cNvPr>
+          <p:cNvPr id="2" name="Picture 1"/>
           <p:cNvPicPr>
             <a:picLocks noChangeAspect="1"/>
           </p:cNvPicPr>
@@ -12302,7 +12300,7 @@
         <p:spPr>
           <a:xfrm>
             <a:off x="1257081" y="1385893"/>
-            <a:ext cx="7387076" cy="2598193"/>
+            <a:ext cx="7387679" cy="2544091"/>
           </a:xfrm>
           <a:prstGeom prst="rect">
             <a:avLst/>
@@ -12359,6 +12357,13 @@
   <p:clrMapOvr>
     <a:masterClrMapping/>
   </p:clrMapOvr>
+  <p:timing>
+    <p:tnLst>
+      <p:par>
+        <p:cTn id="1" dur="indefinite" restart="never" nodeType="tmRoot"/>
+      </p:par>
+    </p:tnLst>
+  </p:timing>
 </p:sld>
 </file>
 
@@ -13792,13 +13797,7 @@
       </p:sp>
       <p:pic>
         <p:nvPicPr>
-          <p:cNvPr id="20" name="Grafik 19">
-            <a:extLst>
-              <a:ext uri="{FF2B5EF4-FFF2-40B4-BE49-F238E27FC236}">
-                <a16:creationId xmlns:a16="http://schemas.microsoft.com/office/drawing/2014/main" id="{F19985EA-91C6-438F-88F9-97F8B03A4F57}"/>
-              </a:ext>
-            </a:extLst>
-          </p:cNvPr>
+          <p:cNvPr id="2" name="Picture 1"/>
           <p:cNvPicPr>
             <a:picLocks noChangeAspect="1"/>
           </p:cNvPicPr>
@@ -13823,7 +13822,7 @@
         <p:spPr>
           <a:xfrm>
             <a:off x="1689647" y="1995696"/>
-            <a:ext cx="5764706" cy="2181958"/>
+            <a:ext cx="6194428" cy="2184692"/>
           </a:xfrm>
           <a:prstGeom prst="rect">
             <a:avLst/>
@@ -13840,24 +13839,1589 @@
   <p:clrMapOvr>
     <a:masterClrMapping/>
   </p:clrMapOvr>
+  <p:timing>
+    <p:tnLst>
+      <p:par>
+        <p:cTn id="1" dur="indefinite" restart="never" nodeType="tmRoot"/>
+      </p:par>
+    </p:tnLst>
+  </p:timing>
+</p:sld>
+</file>
+
+<file path=ppt/slides/slide7.xml><?xml version="1.0" encoding="utf-8"?>
+<p:sld xmlns:a="http://schemas.openxmlformats.org/drawingml/2006/main" xmlns:r="http://schemas.openxmlformats.org/officeDocument/2006/relationships" xmlns:p="http://schemas.openxmlformats.org/presentationml/2006/main">
+  <p:cSld>
+    <p:spTree>
+      <p:nvGrpSpPr>
+        <p:cNvPr id="1" name=""/>
+        <p:cNvGrpSpPr/>
+        <p:nvPr/>
+      </p:nvGrpSpPr>
+      <p:grpSpPr>
+        <a:xfrm>
+          <a:off x="0" y="0"/>
+          <a:ext cx="0" cy="0"/>
+          <a:chOff x="0" y="0"/>
+          <a:chExt cx="0" cy="0"/>
+        </a:xfrm>
+      </p:grpSpPr>
+      <p:sp>
+        <p:nvSpPr>
+          <p:cNvPr id="4" name="Rectangle 3"/>
+          <p:cNvSpPr>
+            <a:spLocks noChangeArrowheads="1"/>
+          </p:cNvSpPr>
+          <p:nvPr/>
+        </p:nvSpPr>
+        <p:spPr bwMode="auto">
+          <a:xfrm rot="-5400000">
+            <a:off x="4571544" y="-3744456"/>
+            <a:ext cx="828000" cy="8316912"/>
+          </a:xfrm>
+          <a:prstGeom prst="rect">
+            <a:avLst/>
+          </a:prstGeom>
+          <a:gradFill rotWithShape="1">
+            <a:gsLst>
+              <a:gs pos="0">
+                <a:srgbClr val="8E8FB0"/>
+              </a:gs>
+              <a:gs pos="100000">
+                <a:schemeClr val="bg1"/>
+              </a:gs>
+            </a:gsLst>
+            <a:lin ang="5400000" scaled="1"/>
+          </a:gradFill>
+          <a:ln>
+            <a:noFill/>
+          </a:ln>
+          <a:extLst>
+            <a:ext uri="{91240B29-F687-4F45-9708-019B960494DF}">
+              <a14:hiddenLine xmlns:a14="http://schemas.microsoft.com/office/drawing/2010/main" w="9525">
+                <a:solidFill>
+                  <a:srgbClr val="000000"/>
+                </a:solidFill>
+                <a:miter lim="800000"/>
+                <a:headEnd/>
+                <a:tailEnd/>
+              </a14:hiddenLine>
+            </a:ext>
+          </a:extLst>
+        </p:spPr>
+        <p:txBody>
+          <a:bodyPr wrap="none" anchor="ctr">
+            <a:noAutofit/>
+          </a:bodyPr>
+          <a:lstStyle>
+            <a:lvl1pPr eaLnBrk="0" hangingPunct="0">
+              <a:spcBef>
+                <a:spcPct val="20000"/>
+              </a:spcBef>
+              <a:buChar char="•"/>
+              <a:defRPr sz="3200">
+                <a:solidFill>
+                  <a:schemeClr val="tx1"/>
+                </a:solidFill>
+                <a:latin typeface="Arial" charset="0"/>
+                <a:cs typeface="Arial" charset="0"/>
+              </a:defRPr>
+            </a:lvl1pPr>
+            <a:lvl2pPr marL="742950" indent="-285750" eaLnBrk="0" hangingPunct="0">
+              <a:spcBef>
+                <a:spcPct val="20000"/>
+              </a:spcBef>
+              <a:buChar char="–"/>
+              <a:defRPr sz="2800">
+                <a:solidFill>
+                  <a:schemeClr val="tx1"/>
+                </a:solidFill>
+                <a:latin typeface="Arial" charset="0"/>
+                <a:cs typeface="Arial" charset="0"/>
+              </a:defRPr>
+            </a:lvl2pPr>
+            <a:lvl3pPr marL="1143000" indent="-228600" eaLnBrk="0" hangingPunct="0">
+              <a:spcBef>
+                <a:spcPct val="20000"/>
+              </a:spcBef>
+              <a:buChar char="•"/>
+              <a:defRPr sz="2400">
+                <a:solidFill>
+                  <a:schemeClr val="tx1"/>
+                </a:solidFill>
+                <a:latin typeface="Arial" charset="0"/>
+                <a:cs typeface="Arial" charset="0"/>
+              </a:defRPr>
+            </a:lvl3pPr>
+            <a:lvl4pPr marL="1600200" indent="-228600" eaLnBrk="0" hangingPunct="0">
+              <a:spcBef>
+                <a:spcPct val="20000"/>
+              </a:spcBef>
+              <a:buChar char="–"/>
+              <a:defRPr sz="2000">
+                <a:solidFill>
+                  <a:schemeClr val="tx1"/>
+                </a:solidFill>
+                <a:latin typeface="Arial" charset="0"/>
+                <a:cs typeface="Arial" charset="0"/>
+              </a:defRPr>
+            </a:lvl4pPr>
+            <a:lvl5pPr marL="2057400" indent="-228600" eaLnBrk="0" hangingPunct="0">
+              <a:spcBef>
+                <a:spcPct val="20000"/>
+              </a:spcBef>
+              <a:buChar char="»"/>
+              <a:defRPr sz="2000">
+                <a:solidFill>
+                  <a:schemeClr val="tx1"/>
+                </a:solidFill>
+                <a:latin typeface="Arial" charset="0"/>
+                <a:cs typeface="Arial" charset="0"/>
+              </a:defRPr>
+            </a:lvl5pPr>
+            <a:lvl6pPr marL="2514600" indent="-228600" eaLnBrk="0" fontAlgn="base" hangingPunct="0">
+              <a:spcBef>
+                <a:spcPct val="20000"/>
+              </a:spcBef>
+              <a:spcAft>
+                <a:spcPct val="0"/>
+              </a:spcAft>
+              <a:buChar char="»"/>
+              <a:defRPr sz="2000">
+                <a:solidFill>
+                  <a:schemeClr val="tx1"/>
+                </a:solidFill>
+                <a:latin typeface="Arial" charset="0"/>
+                <a:cs typeface="Arial" charset="0"/>
+              </a:defRPr>
+            </a:lvl6pPr>
+            <a:lvl7pPr marL="2971800" indent="-228600" eaLnBrk="0" fontAlgn="base" hangingPunct="0">
+              <a:spcBef>
+                <a:spcPct val="20000"/>
+              </a:spcBef>
+              <a:spcAft>
+                <a:spcPct val="0"/>
+              </a:spcAft>
+              <a:buChar char="»"/>
+              <a:defRPr sz="2000">
+                <a:solidFill>
+                  <a:schemeClr val="tx1"/>
+                </a:solidFill>
+                <a:latin typeface="Arial" charset="0"/>
+                <a:cs typeface="Arial" charset="0"/>
+              </a:defRPr>
+            </a:lvl7pPr>
+            <a:lvl8pPr marL="3429000" indent="-228600" eaLnBrk="0" fontAlgn="base" hangingPunct="0">
+              <a:spcBef>
+                <a:spcPct val="20000"/>
+              </a:spcBef>
+              <a:spcAft>
+                <a:spcPct val="0"/>
+              </a:spcAft>
+              <a:buChar char="»"/>
+              <a:defRPr sz="2000">
+                <a:solidFill>
+                  <a:schemeClr val="tx1"/>
+                </a:solidFill>
+                <a:latin typeface="Arial" charset="0"/>
+                <a:cs typeface="Arial" charset="0"/>
+              </a:defRPr>
+            </a:lvl8pPr>
+            <a:lvl9pPr marL="3886200" indent="-228600" eaLnBrk="0" fontAlgn="base" hangingPunct="0">
+              <a:spcBef>
+                <a:spcPct val="20000"/>
+              </a:spcBef>
+              <a:spcAft>
+                <a:spcPct val="0"/>
+              </a:spcAft>
+              <a:buChar char="»"/>
+              <a:defRPr sz="2000">
+                <a:solidFill>
+                  <a:schemeClr val="tx1"/>
+                </a:solidFill>
+                <a:latin typeface="Arial" charset="0"/>
+                <a:cs typeface="Arial" charset="0"/>
+              </a:defRPr>
+            </a:lvl9pPr>
+          </a:lstStyle>
+          <a:p>
+            <a:pPr eaLnBrk="1" hangingPunct="1">
+              <a:spcBef>
+                <a:spcPct val="0"/>
+              </a:spcBef>
+              <a:buFontTx/>
+              <a:buNone/>
+            </a:pPr>
+            <a:endParaRPr lang="en-US" altLang="en-US" sz="1800">
+              <a:latin typeface="FoundrySterling-Medium" panose="00000500000000000000" pitchFamily="2" charset="0"/>
+            </a:endParaRPr>
+          </a:p>
+        </p:txBody>
+      </p:sp>
+      <p:sp>
+        <p:nvSpPr>
+          <p:cNvPr id="5" name="Line 10"/>
+          <p:cNvSpPr>
+            <a:spLocks noChangeShapeType="1"/>
+          </p:cNvSpPr>
+          <p:nvPr/>
+        </p:nvSpPr>
+        <p:spPr bwMode="auto">
+          <a:xfrm>
+            <a:off x="792163" y="6453188"/>
+            <a:ext cx="8316912" cy="0"/>
+          </a:xfrm>
+          <a:prstGeom prst="line">
+            <a:avLst/>
+          </a:prstGeom>
+          <a:noFill/>
+          <a:ln w="9525">
+            <a:solidFill>
+              <a:srgbClr val="8E8FB0"/>
+            </a:solidFill>
+            <a:round/>
+            <a:headEnd/>
+            <a:tailEnd/>
+          </a:ln>
+          <a:extLst>
+            <a:ext uri="{909E8E84-426E-40DD-AFC4-6F175D3DCCD1}">
+              <a14:hiddenFill xmlns:a14="http://schemas.microsoft.com/office/drawing/2010/main">
+                <a:noFill/>
+              </a14:hiddenFill>
+            </a:ext>
+          </a:extLst>
+        </p:spPr>
+        <p:txBody>
+          <a:bodyPr>
+            <a:noAutofit/>
+          </a:bodyPr>
+          <a:lstStyle/>
+          <a:p>
+            <a:endParaRPr lang="en-GB">
+              <a:latin typeface="FoundrySterling-Medium" panose="00000500000000000000" pitchFamily="2" charset="0"/>
+            </a:endParaRPr>
+          </a:p>
+        </p:txBody>
+      </p:sp>
+      <p:sp>
+        <p:nvSpPr>
+          <p:cNvPr id="6" name="Rectangle 4"/>
+          <p:cNvSpPr>
+            <a:spLocks noChangeArrowheads="1"/>
+          </p:cNvSpPr>
+          <p:nvPr/>
+        </p:nvSpPr>
+        <p:spPr bwMode="auto">
+          <a:xfrm>
+            <a:off x="0" y="0"/>
+            <a:ext cx="827088" cy="6858000"/>
+          </a:xfrm>
+          <a:prstGeom prst="rect">
+            <a:avLst/>
+          </a:prstGeom>
+          <a:solidFill>
+            <a:srgbClr val="002147"/>
+          </a:solidFill>
+          <a:ln>
+            <a:noFill/>
+          </a:ln>
+        </p:spPr>
+        <p:txBody>
+          <a:bodyPr wrap="none" anchor="ctr">
+            <a:noAutofit/>
+          </a:bodyPr>
+          <a:lstStyle>
+            <a:lvl1pPr eaLnBrk="0" hangingPunct="0">
+              <a:spcBef>
+                <a:spcPct val="20000"/>
+              </a:spcBef>
+              <a:buChar char="•"/>
+              <a:defRPr sz="3200">
+                <a:solidFill>
+                  <a:schemeClr val="tx1"/>
+                </a:solidFill>
+                <a:latin typeface="Arial" charset="0"/>
+                <a:cs typeface="Arial" charset="0"/>
+              </a:defRPr>
+            </a:lvl1pPr>
+            <a:lvl2pPr marL="742950" indent="-285750" eaLnBrk="0" hangingPunct="0">
+              <a:spcBef>
+                <a:spcPct val="20000"/>
+              </a:spcBef>
+              <a:buChar char="–"/>
+              <a:defRPr sz="2800">
+                <a:solidFill>
+                  <a:schemeClr val="tx1"/>
+                </a:solidFill>
+                <a:latin typeface="Arial" charset="0"/>
+                <a:cs typeface="Arial" charset="0"/>
+              </a:defRPr>
+            </a:lvl2pPr>
+            <a:lvl3pPr marL="1143000" indent="-228600" eaLnBrk="0" hangingPunct="0">
+              <a:spcBef>
+                <a:spcPct val="20000"/>
+              </a:spcBef>
+              <a:buChar char="•"/>
+              <a:defRPr sz="2400">
+                <a:solidFill>
+                  <a:schemeClr val="tx1"/>
+                </a:solidFill>
+                <a:latin typeface="Arial" charset="0"/>
+                <a:cs typeface="Arial" charset="0"/>
+              </a:defRPr>
+            </a:lvl3pPr>
+            <a:lvl4pPr marL="1600200" indent="-228600" eaLnBrk="0" hangingPunct="0">
+              <a:spcBef>
+                <a:spcPct val="20000"/>
+              </a:spcBef>
+              <a:buChar char="–"/>
+              <a:defRPr sz="2000">
+                <a:solidFill>
+                  <a:schemeClr val="tx1"/>
+                </a:solidFill>
+                <a:latin typeface="Arial" charset="0"/>
+                <a:cs typeface="Arial" charset="0"/>
+              </a:defRPr>
+            </a:lvl4pPr>
+            <a:lvl5pPr marL="2057400" indent="-228600" eaLnBrk="0" hangingPunct="0">
+              <a:spcBef>
+                <a:spcPct val="20000"/>
+              </a:spcBef>
+              <a:buChar char="»"/>
+              <a:defRPr sz="2000">
+                <a:solidFill>
+                  <a:schemeClr val="tx1"/>
+                </a:solidFill>
+                <a:latin typeface="Arial" charset="0"/>
+                <a:cs typeface="Arial" charset="0"/>
+              </a:defRPr>
+            </a:lvl5pPr>
+            <a:lvl6pPr marL="2514600" indent="-228600" eaLnBrk="0" fontAlgn="base" hangingPunct="0">
+              <a:spcBef>
+                <a:spcPct val="20000"/>
+              </a:spcBef>
+              <a:spcAft>
+                <a:spcPct val="0"/>
+              </a:spcAft>
+              <a:buChar char="»"/>
+              <a:defRPr sz="2000">
+                <a:solidFill>
+                  <a:schemeClr val="tx1"/>
+                </a:solidFill>
+                <a:latin typeface="Arial" charset="0"/>
+                <a:cs typeface="Arial" charset="0"/>
+              </a:defRPr>
+            </a:lvl6pPr>
+            <a:lvl7pPr marL="2971800" indent="-228600" eaLnBrk="0" fontAlgn="base" hangingPunct="0">
+              <a:spcBef>
+                <a:spcPct val="20000"/>
+              </a:spcBef>
+              <a:spcAft>
+                <a:spcPct val="0"/>
+              </a:spcAft>
+              <a:buChar char="»"/>
+              <a:defRPr sz="2000">
+                <a:solidFill>
+                  <a:schemeClr val="tx1"/>
+                </a:solidFill>
+                <a:latin typeface="Arial" charset="0"/>
+                <a:cs typeface="Arial" charset="0"/>
+              </a:defRPr>
+            </a:lvl7pPr>
+            <a:lvl8pPr marL="3429000" indent="-228600" eaLnBrk="0" fontAlgn="base" hangingPunct="0">
+              <a:spcBef>
+                <a:spcPct val="20000"/>
+              </a:spcBef>
+              <a:spcAft>
+                <a:spcPct val="0"/>
+              </a:spcAft>
+              <a:buChar char="»"/>
+              <a:defRPr sz="2000">
+                <a:solidFill>
+                  <a:schemeClr val="tx1"/>
+                </a:solidFill>
+                <a:latin typeface="Arial" charset="0"/>
+                <a:cs typeface="Arial" charset="0"/>
+              </a:defRPr>
+            </a:lvl8pPr>
+            <a:lvl9pPr marL="3886200" indent="-228600" eaLnBrk="0" fontAlgn="base" hangingPunct="0">
+              <a:spcBef>
+                <a:spcPct val="20000"/>
+              </a:spcBef>
+              <a:spcAft>
+                <a:spcPct val="0"/>
+              </a:spcAft>
+              <a:buChar char="»"/>
+              <a:defRPr sz="2000">
+                <a:solidFill>
+                  <a:schemeClr val="tx1"/>
+                </a:solidFill>
+                <a:latin typeface="Arial" charset="0"/>
+                <a:cs typeface="Arial" charset="0"/>
+              </a:defRPr>
+            </a:lvl9pPr>
+          </a:lstStyle>
+          <a:p>
+            <a:pPr eaLnBrk="1" hangingPunct="1">
+              <a:spcBef>
+                <a:spcPct val="0"/>
+              </a:spcBef>
+              <a:buFontTx/>
+              <a:buNone/>
+            </a:pPr>
+            <a:endParaRPr lang="en-US" altLang="en-US" sz="1800">
+              <a:latin typeface="FoundrySterling-Medium" panose="00000500000000000000" pitchFamily="2" charset="0"/>
+            </a:endParaRPr>
+          </a:p>
+        </p:txBody>
+      </p:sp>
+      <p:sp>
+        <p:nvSpPr>
+          <p:cNvPr id="7" name="Rectangle 6"/>
+          <p:cNvSpPr>
+            <a:spLocks noChangeArrowheads="1"/>
+          </p:cNvSpPr>
+          <p:nvPr/>
+        </p:nvSpPr>
+        <p:spPr bwMode="auto">
+          <a:xfrm>
+            <a:off x="925846" y="5617"/>
+            <a:ext cx="7192633" cy="830997"/>
+          </a:xfrm>
+          <a:prstGeom prst="rect">
+            <a:avLst/>
+          </a:prstGeom>
+          <a:noFill/>
+          <a:ln>
+            <a:noFill/>
+          </a:ln>
+          <a:extLst>
+            <a:ext uri="{909E8E84-426E-40DD-AFC4-6F175D3DCCD1}">
+              <a14:hiddenFill xmlns:a14="http://schemas.microsoft.com/office/drawing/2010/main">
+                <a:solidFill>
+                  <a:srgbClr val="FFFFFF"/>
+                </a:solidFill>
+              </a14:hiddenFill>
+            </a:ext>
+            <a:ext uri="{91240B29-F687-4F45-9708-019B960494DF}">
+              <a14:hiddenLine xmlns:a14="http://schemas.microsoft.com/office/drawing/2010/main" w="9525">
+                <a:solidFill>
+                  <a:srgbClr val="000000"/>
+                </a:solidFill>
+                <a:miter lim="800000"/>
+                <a:headEnd/>
+                <a:tailEnd/>
+              </a14:hiddenLine>
+            </a:ext>
+          </a:extLst>
+        </p:spPr>
+        <p:txBody>
+          <a:bodyPr wrap="none" anchor="ctr" anchorCtr="0">
+            <a:noAutofit/>
+          </a:bodyPr>
+          <a:lstStyle>
+            <a:lvl1pPr eaLnBrk="0" hangingPunct="0">
+              <a:spcBef>
+                <a:spcPct val="20000"/>
+              </a:spcBef>
+              <a:buChar char="•"/>
+              <a:defRPr sz="3200">
+                <a:solidFill>
+                  <a:schemeClr val="tx1"/>
+                </a:solidFill>
+                <a:latin typeface="Arial" charset="0"/>
+                <a:cs typeface="Arial" charset="0"/>
+              </a:defRPr>
+            </a:lvl1pPr>
+            <a:lvl2pPr marL="742950" indent="-285750" eaLnBrk="0" hangingPunct="0">
+              <a:spcBef>
+                <a:spcPct val="20000"/>
+              </a:spcBef>
+              <a:buChar char="–"/>
+              <a:defRPr sz="2800">
+                <a:solidFill>
+                  <a:schemeClr val="tx1"/>
+                </a:solidFill>
+                <a:latin typeface="Arial" charset="0"/>
+                <a:cs typeface="Arial" charset="0"/>
+              </a:defRPr>
+            </a:lvl2pPr>
+            <a:lvl3pPr marL="1143000" indent="-228600" eaLnBrk="0" hangingPunct="0">
+              <a:spcBef>
+                <a:spcPct val="20000"/>
+              </a:spcBef>
+              <a:buChar char="•"/>
+              <a:defRPr sz="2400">
+                <a:solidFill>
+                  <a:schemeClr val="tx1"/>
+                </a:solidFill>
+                <a:latin typeface="Arial" charset="0"/>
+                <a:cs typeface="Arial" charset="0"/>
+              </a:defRPr>
+            </a:lvl3pPr>
+            <a:lvl4pPr marL="1600200" indent="-228600" eaLnBrk="0" hangingPunct="0">
+              <a:spcBef>
+                <a:spcPct val="20000"/>
+              </a:spcBef>
+              <a:buChar char="–"/>
+              <a:defRPr sz="2000">
+                <a:solidFill>
+                  <a:schemeClr val="tx1"/>
+                </a:solidFill>
+                <a:latin typeface="Arial" charset="0"/>
+                <a:cs typeface="Arial" charset="0"/>
+              </a:defRPr>
+            </a:lvl4pPr>
+            <a:lvl5pPr marL="2057400" indent="-228600" eaLnBrk="0" hangingPunct="0">
+              <a:spcBef>
+                <a:spcPct val="20000"/>
+              </a:spcBef>
+              <a:buChar char="»"/>
+              <a:defRPr sz="2000">
+                <a:solidFill>
+                  <a:schemeClr val="tx1"/>
+                </a:solidFill>
+                <a:latin typeface="Arial" charset="0"/>
+                <a:cs typeface="Arial" charset="0"/>
+              </a:defRPr>
+            </a:lvl5pPr>
+            <a:lvl6pPr marL="2514600" indent="-228600" eaLnBrk="0" fontAlgn="base" hangingPunct="0">
+              <a:spcBef>
+                <a:spcPct val="20000"/>
+              </a:spcBef>
+              <a:spcAft>
+                <a:spcPct val="0"/>
+              </a:spcAft>
+              <a:buChar char="»"/>
+              <a:defRPr sz="2000">
+                <a:solidFill>
+                  <a:schemeClr val="tx1"/>
+                </a:solidFill>
+                <a:latin typeface="Arial" charset="0"/>
+                <a:cs typeface="Arial" charset="0"/>
+              </a:defRPr>
+            </a:lvl6pPr>
+            <a:lvl7pPr marL="2971800" indent="-228600" eaLnBrk="0" fontAlgn="base" hangingPunct="0">
+              <a:spcBef>
+                <a:spcPct val="20000"/>
+              </a:spcBef>
+              <a:spcAft>
+                <a:spcPct val="0"/>
+              </a:spcAft>
+              <a:buChar char="»"/>
+              <a:defRPr sz="2000">
+                <a:solidFill>
+                  <a:schemeClr val="tx1"/>
+                </a:solidFill>
+                <a:latin typeface="Arial" charset="0"/>
+                <a:cs typeface="Arial" charset="0"/>
+              </a:defRPr>
+            </a:lvl7pPr>
+            <a:lvl8pPr marL="3429000" indent="-228600" eaLnBrk="0" fontAlgn="base" hangingPunct="0">
+              <a:spcBef>
+                <a:spcPct val="20000"/>
+              </a:spcBef>
+              <a:spcAft>
+                <a:spcPct val="0"/>
+              </a:spcAft>
+              <a:buChar char="»"/>
+              <a:defRPr sz="2000">
+                <a:solidFill>
+                  <a:schemeClr val="tx1"/>
+                </a:solidFill>
+                <a:latin typeface="Arial" charset="0"/>
+                <a:cs typeface="Arial" charset="0"/>
+              </a:defRPr>
+            </a:lvl8pPr>
+            <a:lvl9pPr marL="3886200" indent="-228600" eaLnBrk="0" fontAlgn="base" hangingPunct="0">
+              <a:spcBef>
+                <a:spcPct val="20000"/>
+              </a:spcBef>
+              <a:spcAft>
+                <a:spcPct val="0"/>
+              </a:spcAft>
+              <a:buChar char="»"/>
+              <a:defRPr sz="2000">
+                <a:solidFill>
+                  <a:schemeClr val="tx1"/>
+                </a:solidFill>
+                <a:latin typeface="Arial" charset="0"/>
+                <a:cs typeface="Arial" charset="0"/>
+              </a:defRPr>
+            </a:lvl9pPr>
+          </a:lstStyle>
+          <a:p>
+            <a:pPr eaLnBrk="1" hangingPunct="1">
+              <a:spcBef>
+                <a:spcPct val="0"/>
+              </a:spcBef>
+              <a:buFontTx/>
+              <a:buNone/>
+            </a:pPr>
+            <a:r>
+              <a:rPr lang="en-GB" altLang="en-US" sz="2200" dirty="0" smtClean="0">
+                <a:solidFill>
+                  <a:srgbClr val="002147"/>
+                </a:solidFill>
+                <a:latin typeface="FoundrySterling-Medium" panose="00000500000000000000" pitchFamily="2" charset="0"/>
+                <a:ea typeface="Verdana" panose="020B0604030504040204" pitchFamily="34" charset="0"/>
+                <a:cs typeface="Verdana" panose="020B0604030504040204" pitchFamily="34" charset="0"/>
+              </a:rPr>
+              <a:t>Test to Validate Implementation</a:t>
+            </a:r>
+            <a:endParaRPr lang="en-GB" altLang="en-US" sz="2200" dirty="0">
+              <a:solidFill>
+                <a:srgbClr val="002147"/>
+              </a:solidFill>
+              <a:latin typeface="FoundrySterling-Medium" panose="00000500000000000000" pitchFamily="2" charset="0"/>
+              <a:ea typeface="Verdana" panose="020B0604030504040204" pitchFamily="34" charset="0"/>
+              <a:cs typeface="Verdana" panose="020B0604030504040204" pitchFamily="34" charset="0"/>
+            </a:endParaRPr>
+          </a:p>
+        </p:txBody>
+      </p:sp>
+      <p:sp>
+        <p:nvSpPr>
+          <p:cNvPr id="12" name="TextBox 3"/>
+          <p:cNvSpPr txBox="1">
+            <a:spLocks noChangeArrowheads="1"/>
+          </p:cNvSpPr>
+          <p:nvPr/>
+        </p:nvSpPr>
+        <p:spPr bwMode="auto">
+          <a:xfrm>
+            <a:off x="1043607" y="980728"/>
+            <a:ext cx="7927557" cy="5328592"/>
+          </a:xfrm>
+          <a:prstGeom prst="rect">
+            <a:avLst/>
+          </a:prstGeom>
+          <a:noFill/>
+          <a:ln w="25400">
+            <a:solidFill>
+              <a:srgbClr val="002147"/>
+            </a:solidFill>
+            <a:miter lim="800000"/>
+            <a:headEnd/>
+            <a:tailEnd/>
+          </a:ln>
+          <a:extLst>
+            <a:ext uri="{909E8E84-426E-40DD-AFC4-6F175D3DCCD1}">
+              <a14:hiddenFill xmlns:a14="http://schemas.microsoft.com/office/drawing/2010/main">
+                <a:solidFill>
+                  <a:srgbClr val="FFFFFF"/>
+                </a:solidFill>
+              </a14:hiddenFill>
+            </a:ext>
+          </a:extLst>
+        </p:spPr>
+        <p:txBody>
+          <a:bodyPr wrap="square">
+            <a:noAutofit/>
+          </a:bodyPr>
+          <a:lstStyle>
+            <a:lvl1pPr eaLnBrk="0" hangingPunct="0">
+              <a:spcBef>
+                <a:spcPct val="20000"/>
+              </a:spcBef>
+              <a:buChar char="•"/>
+              <a:defRPr sz="3200">
+                <a:solidFill>
+                  <a:schemeClr val="tx1"/>
+                </a:solidFill>
+                <a:latin typeface="Arial" charset="0"/>
+                <a:cs typeface="Arial" charset="0"/>
+              </a:defRPr>
+            </a:lvl1pPr>
+            <a:lvl2pPr marL="742950" indent="-285750" eaLnBrk="0" hangingPunct="0">
+              <a:spcBef>
+                <a:spcPct val="20000"/>
+              </a:spcBef>
+              <a:buChar char="–"/>
+              <a:defRPr sz="2800">
+                <a:solidFill>
+                  <a:schemeClr val="tx1"/>
+                </a:solidFill>
+                <a:latin typeface="Arial" charset="0"/>
+                <a:cs typeface="Arial" charset="0"/>
+              </a:defRPr>
+            </a:lvl2pPr>
+            <a:lvl3pPr marL="1143000" indent="-228600" eaLnBrk="0" hangingPunct="0">
+              <a:spcBef>
+                <a:spcPct val="20000"/>
+              </a:spcBef>
+              <a:buChar char="•"/>
+              <a:defRPr sz="2400">
+                <a:solidFill>
+                  <a:schemeClr val="tx1"/>
+                </a:solidFill>
+                <a:latin typeface="Arial" charset="0"/>
+                <a:cs typeface="Arial" charset="0"/>
+              </a:defRPr>
+            </a:lvl3pPr>
+            <a:lvl4pPr marL="1600200" indent="-228600" eaLnBrk="0" hangingPunct="0">
+              <a:spcBef>
+                <a:spcPct val="20000"/>
+              </a:spcBef>
+              <a:buChar char="–"/>
+              <a:defRPr sz="2000">
+                <a:solidFill>
+                  <a:schemeClr val="tx1"/>
+                </a:solidFill>
+                <a:latin typeface="Arial" charset="0"/>
+                <a:cs typeface="Arial" charset="0"/>
+              </a:defRPr>
+            </a:lvl4pPr>
+            <a:lvl5pPr marL="2057400" indent="-228600" eaLnBrk="0" hangingPunct="0">
+              <a:spcBef>
+                <a:spcPct val="20000"/>
+              </a:spcBef>
+              <a:buChar char="»"/>
+              <a:defRPr sz="2000">
+                <a:solidFill>
+                  <a:schemeClr val="tx1"/>
+                </a:solidFill>
+                <a:latin typeface="Arial" charset="0"/>
+                <a:cs typeface="Arial" charset="0"/>
+              </a:defRPr>
+            </a:lvl5pPr>
+            <a:lvl6pPr marL="2514600" indent="-228600" eaLnBrk="0" fontAlgn="base" hangingPunct="0">
+              <a:spcBef>
+                <a:spcPct val="20000"/>
+              </a:spcBef>
+              <a:spcAft>
+                <a:spcPct val="0"/>
+              </a:spcAft>
+              <a:buChar char="»"/>
+              <a:defRPr sz="2000">
+                <a:solidFill>
+                  <a:schemeClr val="tx1"/>
+                </a:solidFill>
+                <a:latin typeface="Arial" charset="0"/>
+                <a:cs typeface="Arial" charset="0"/>
+              </a:defRPr>
+            </a:lvl6pPr>
+            <a:lvl7pPr marL="2971800" indent="-228600" eaLnBrk="0" fontAlgn="base" hangingPunct="0">
+              <a:spcBef>
+                <a:spcPct val="20000"/>
+              </a:spcBef>
+              <a:spcAft>
+                <a:spcPct val="0"/>
+              </a:spcAft>
+              <a:buChar char="»"/>
+              <a:defRPr sz="2000">
+                <a:solidFill>
+                  <a:schemeClr val="tx1"/>
+                </a:solidFill>
+                <a:latin typeface="Arial" charset="0"/>
+                <a:cs typeface="Arial" charset="0"/>
+              </a:defRPr>
+            </a:lvl7pPr>
+            <a:lvl8pPr marL="3429000" indent="-228600" eaLnBrk="0" fontAlgn="base" hangingPunct="0">
+              <a:spcBef>
+                <a:spcPct val="20000"/>
+              </a:spcBef>
+              <a:spcAft>
+                <a:spcPct val="0"/>
+              </a:spcAft>
+              <a:buChar char="»"/>
+              <a:defRPr sz="2000">
+                <a:solidFill>
+                  <a:schemeClr val="tx1"/>
+                </a:solidFill>
+                <a:latin typeface="Arial" charset="0"/>
+                <a:cs typeface="Arial" charset="0"/>
+              </a:defRPr>
+            </a:lvl8pPr>
+            <a:lvl9pPr marL="3886200" indent="-228600" eaLnBrk="0" fontAlgn="base" hangingPunct="0">
+              <a:spcBef>
+                <a:spcPct val="20000"/>
+              </a:spcBef>
+              <a:spcAft>
+                <a:spcPct val="0"/>
+              </a:spcAft>
+              <a:buChar char="»"/>
+              <a:defRPr sz="2000">
+                <a:solidFill>
+                  <a:schemeClr val="tx1"/>
+                </a:solidFill>
+                <a:latin typeface="Arial" charset="0"/>
+                <a:cs typeface="Arial" charset="0"/>
+              </a:defRPr>
+            </a:lvl9pPr>
+          </a:lstStyle>
+          <a:p>
+            <a:pPr marL="438150" indent="-342900"/>
+            <a:endParaRPr lang="en-GB" sz="1600" dirty="0">
+              <a:solidFill>
+                <a:srgbClr val="002147"/>
+              </a:solidFill>
+              <a:latin typeface="FoundrySterling-Medium"/>
+            </a:endParaRPr>
+          </a:p>
+          <a:p>
+            <a:pPr marL="95250">
+              <a:buNone/>
+            </a:pPr>
+            <a:endParaRPr lang="en-GB" sz="2000" b="1" dirty="0">
+              <a:solidFill>
+                <a:srgbClr val="002147"/>
+              </a:solidFill>
+              <a:latin typeface="FoundrySterling-Medium"/>
+            </a:endParaRPr>
+          </a:p>
+        </p:txBody>
+      </p:sp>
+      <p:pic>
+        <p:nvPicPr>
+          <p:cNvPr id="13" name="Picture 12"/>
+          <p:cNvPicPr/>
+          <p:nvPr/>
+        </p:nvPicPr>
+        <p:blipFill>
+          <a:blip r:embed="rId5">
+            <a:extLst>
+              <a:ext uri="{28A0092B-C50C-407E-A947-70E740481C1C}">
+                <a14:useLocalDpi xmlns:a14="http://schemas.microsoft.com/office/drawing/2010/main" val="0"/>
+              </a:ext>
+            </a:extLst>
+          </a:blip>
+          <a:stretch>
+            <a:fillRect/>
+          </a:stretch>
+        </p:blipFill>
+        <p:spPr>
+          <a:xfrm>
+            <a:off x="6522927" y="5617"/>
+            <a:ext cx="2584450" cy="830997"/>
+          </a:xfrm>
+          <a:prstGeom prst="rect">
+            <a:avLst/>
+          </a:prstGeom>
+        </p:spPr>
+      </p:pic>
+      <p:sp>
+        <p:nvSpPr>
+          <p:cNvPr id="11" name="Text Box 7 1"/>
+          <p:cNvSpPr txBox="1">
+            <a:spLocks noChangeArrowheads="1"/>
+          </p:cNvSpPr>
+          <p:nvPr/>
+        </p:nvSpPr>
+        <p:spPr bwMode="auto">
+          <a:xfrm rot="-5400000">
+            <a:off x="-840390" y="1178143"/>
+            <a:ext cx="2507868" cy="415500"/>
+          </a:xfrm>
+          <a:prstGeom prst="rect">
+            <a:avLst/>
+          </a:prstGeom>
+          <a:noFill/>
+          <a:ln>
+            <a:noFill/>
+          </a:ln>
+          <a:extLst>
+            <a:ext uri="{909E8E84-426E-40DD-AFC4-6F175D3DCCD1}">
+              <a14:hiddenFill xmlns:a14="http://schemas.microsoft.com/office/drawing/2010/main">
+                <a:solidFill>
+                  <a:srgbClr val="FFFFFF"/>
+                </a:solidFill>
+              </a14:hiddenFill>
+            </a:ext>
+            <a:ext uri="{91240B29-F687-4F45-9708-019B960494DF}">
+              <a14:hiddenLine xmlns:a14="http://schemas.microsoft.com/office/drawing/2010/main" w="9525">
+                <a:solidFill>
+                  <a:srgbClr val="000000"/>
+                </a:solidFill>
+                <a:miter lim="800000"/>
+                <a:headEnd/>
+                <a:tailEnd/>
+              </a14:hiddenLine>
+            </a:ext>
+          </a:extLst>
+        </p:spPr>
+        <p:txBody>
+          <a:bodyPr wrap="none">
+            <a:noAutofit/>
+          </a:bodyPr>
+          <a:lstStyle>
+            <a:lvl1pPr eaLnBrk="0" hangingPunct="0">
+              <a:spcBef>
+                <a:spcPct val="20000"/>
+              </a:spcBef>
+              <a:buChar char="•"/>
+              <a:defRPr sz="3200">
+                <a:solidFill>
+                  <a:schemeClr val="tx1"/>
+                </a:solidFill>
+                <a:latin typeface="Arial" charset="0"/>
+                <a:cs typeface="Arial" charset="0"/>
+              </a:defRPr>
+            </a:lvl1pPr>
+            <a:lvl2pPr marL="742950" indent="-285750" eaLnBrk="0" hangingPunct="0">
+              <a:spcBef>
+                <a:spcPct val="20000"/>
+              </a:spcBef>
+              <a:buChar char="–"/>
+              <a:defRPr sz="2800">
+                <a:solidFill>
+                  <a:schemeClr val="tx1"/>
+                </a:solidFill>
+                <a:latin typeface="Arial" charset="0"/>
+                <a:cs typeface="Arial" charset="0"/>
+              </a:defRPr>
+            </a:lvl2pPr>
+            <a:lvl3pPr marL="1143000" indent="-228600" eaLnBrk="0" hangingPunct="0">
+              <a:spcBef>
+                <a:spcPct val="20000"/>
+              </a:spcBef>
+              <a:buChar char="•"/>
+              <a:defRPr sz="2400">
+                <a:solidFill>
+                  <a:schemeClr val="tx1"/>
+                </a:solidFill>
+                <a:latin typeface="Arial" charset="0"/>
+                <a:cs typeface="Arial" charset="0"/>
+              </a:defRPr>
+            </a:lvl3pPr>
+            <a:lvl4pPr marL="1600200" indent="-228600" eaLnBrk="0" hangingPunct="0">
+              <a:spcBef>
+                <a:spcPct val="20000"/>
+              </a:spcBef>
+              <a:buChar char="–"/>
+              <a:defRPr sz="2000">
+                <a:solidFill>
+                  <a:schemeClr val="tx1"/>
+                </a:solidFill>
+                <a:latin typeface="Arial" charset="0"/>
+                <a:cs typeface="Arial" charset="0"/>
+              </a:defRPr>
+            </a:lvl4pPr>
+            <a:lvl5pPr marL="2057400" indent="-228600" eaLnBrk="0" hangingPunct="0">
+              <a:spcBef>
+                <a:spcPct val="20000"/>
+              </a:spcBef>
+              <a:buChar char="»"/>
+              <a:defRPr sz="2000">
+                <a:solidFill>
+                  <a:schemeClr val="tx1"/>
+                </a:solidFill>
+                <a:latin typeface="Arial" charset="0"/>
+                <a:cs typeface="Arial" charset="0"/>
+              </a:defRPr>
+            </a:lvl5pPr>
+            <a:lvl6pPr marL="2514600" indent="-228600" eaLnBrk="0" fontAlgn="base" hangingPunct="0">
+              <a:spcBef>
+                <a:spcPct val="20000"/>
+              </a:spcBef>
+              <a:spcAft>
+                <a:spcPct val="0"/>
+              </a:spcAft>
+              <a:buChar char="»"/>
+              <a:defRPr sz="2000">
+                <a:solidFill>
+                  <a:schemeClr val="tx1"/>
+                </a:solidFill>
+                <a:latin typeface="Arial" charset="0"/>
+                <a:cs typeface="Arial" charset="0"/>
+              </a:defRPr>
+            </a:lvl6pPr>
+            <a:lvl7pPr marL="2971800" indent="-228600" eaLnBrk="0" fontAlgn="base" hangingPunct="0">
+              <a:spcBef>
+                <a:spcPct val="20000"/>
+              </a:spcBef>
+              <a:spcAft>
+                <a:spcPct val="0"/>
+              </a:spcAft>
+              <a:buChar char="»"/>
+              <a:defRPr sz="2000">
+                <a:solidFill>
+                  <a:schemeClr val="tx1"/>
+                </a:solidFill>
+                <a:latin typeface="Arial" charset="0"/>
+                <a:cs typeface="Arial" charset="0"/>
+              </a:defRPr>
+            </a:lvl7pPr>
+            <a:lvl8pPr marL="3429000" indent="-228600" eaLnBrk="0" fontAlgn="base" hangingPunct="0">
+              <a:spcBef>
+                <a:spcPct val="20000"/>
+              </a:spcBef>
+              <a:spcAft>
+                <a:spcPct val="0"/>
+              </a:spcAft>
+              <a:buChar char="»"/>
+              <a:defRPr sz="2000">
+                <a:solidFill>
+                  <a:schemeClr val="tx1"/>
+                </a:solidFill>
+                <a:latin typeface="Arial" charset="0"/>
+                <a:cs typeface="Arial" charset="0"/>
+              </a:defRPr>
+            </a:lvl8pPr>
+            <a:lvl9pPr marL="3886200" indent="-228600" eaLnBrk="0" fontAlgn="base" hangingPunct="0">
+              <a:spcBef>
+                <a:spcPct val="20000"/>
+              </a:spcBef>
+              <a:spcAft>
+                <a:spcPct val="0"/>
+              </a:spcAft>
+              <a:buChar char="»"/>
+              <a:defRPr sz="2000">
+                <a:solidFill>
+                  <a:schemeClr val="tx1"/>
+                </a:solidFill>
+                <a:latin typeface="Arial" charset="0"/>
+                <a:cs typeface="Arial" charset="0"/>
+              </a:defRPr>
+            </a:lvl9pPr>
+          </a:lstStyle>
+          <a:p>
+            <a:pPr eaLnBrk="1" hangingPunct="1">
+              <a:spcBef>
+                <a:spcPct val="0"/>
+              </a:spcBef>
+              <a:buFontTx/>
+              <a:buNone/>
+            </a:pPr>
+            <a:r>
+              <a:rPr lang="en-GB" altLang="en-US" sz="1400" dirty="0">
+                <a:solidFill>
+                  <a:srgbClr val="C9C9D9"/>
+                </a:solidFill>
+                <a:latin typeface="FoundrySterling-Medium" panose="00000500000000000000" pitchFamily="2" charset="0"/>
+              </a:rPr>
+              <a:t>University of Oxford </a:t>
+            </a:r>
+          </a:p>
+        </p:txBody>
+      </p:sp>
+      <p:sp>
+        <p:nvSpPr>
+          <p:cNvPr id="14" name="Text Box 7 2"/>
+          <p:cNvSpPr txBox="1">
+            <a:spLocks noChangeArrowheads="1"/>
+          </p:cNvSpPr>
+          <p:nvPr/>
+        </p:nvSpPr>
+        <p:spPr bwMode="auto">
+          <a:xfrm rot="-5400000">
+            <a:off x="-840390" y="5223838"/>
+            <a:ext cx="2507868" cy="415500"/>
+          </a:xfrm>
+          <a:prstGeom prst="rect">
+            <a:avLst/>
+          </a:prstGeom>
+          <a:noFill/>
+          <a:ln>
+            <a:noFill/>
+          </a:ln>
+          <a:extLst>
+            <a:ext uri="{909E8E84-426E-40DD-AFC4-6F175D3DCCD1}">
+              <a14:hiddenFill xmlns:a14="http://schemas.microsoft.com/office/drawing/2010/main">
+                <a:solidFill>
+                  <a:srgbClr val="FFFFFF"/>
+                </a:solidFill>
+              </a14:hiddenFill>
+            </a:ext>
+            <a:ext uri="{91240B29-F687-4F45-9708-019B960494DF}">
+              <a14:hiddenLine xmlns:a14="http://schemas.microsoft.com/office/drawing/2010/main" w="9525">
+                <a:solidFill>
+                  <a:srgbClr val="000000"/>
+                </a:solidFill>
+                <a:miter lim="800000"/>
+                <a:headEnd/>
+                <a:tailEnd/>
+              </a14:hiddenLine>
+            </a:ext>
+          </a:extLst>
+        </p:spPr>
+        <p:txBody>
+          <a:bodyPr wrap="none">
+            <a:noAutofit/>
+          </a:bodyPr>
+          <a:lstStyle>
+            <a:lvl1pPr eaLnBrk="0" hangingPunct="0">
+              <a:spcBef>
+                <a:spcPct val="20000"/>
+              </a:spcBef>
+              <a:buChar char="•"/>
+              <a:defRPr sz="3200">
+                <a:solidFill>
+                  <a:schemeClr val="tx1"/>
+                </a:solidFill>
+                <a:latin typeface="Arial" charset="0"/>
+                <a:cs typeface="Arial" charset="0"/>
+              </a:defRPr>
+            </a:lvl1pPr>
+            <a:lvl2pPr marL="742950" indent="-285750" eaLnBrk="0" hangingPunct="0">
+              <a:spcBef>
+                <a:spcPct val="20000"/>
+              </a:spcBef>
+              <a:buChar char="–"/>
+              <a:defRPr sz="2800">
+                <a:solidFill>
+                  <a:schemeClr val="tx1"/>
+                </a:solidFill>
+                <a:latin typeface="Arial" charset="0"/>
+                <a:cs typeface="Arial" charset="0"/>
+              </a:defRPr>
+            </a:lvl2pPr>
+            <a:lvl3pPr marL="1143000" indent="-228600" eaLnBrk="0" hangingPunct="0">
+              <a:spcBef>
+                <a:spcPct val="20000"/>
+              </a:spcBef>
+              <a:buChar char="•"/>
+              <a:defRPr sz="2400">
+                <a:solidFill>
+                  <a:schemeClr val="tx1"/>
+                </a:solidFill>
+                <a:latin typeface="Arial" charset="0"/>
+                <a:cs typeface="Arial" charset="0"/>
+              </a:defRPr>
+            </a:lvl3pPr>
+            <a:lvl4pPr marL="1600200" indent="-228600" eaLnBrk="0" hangingPunct="0">
+              <a:spcBef>
+                <a:spcPct val="20000"/>
+              </a:spcBef>
+              <a:buChar char="–"/>
+              <a:defRPr sz="2000">
+                <a:solidFill>
+                  <a:schemeClr val="tx1"/>
+                </a:solidFill>
+                <a:latin typeface="Arial" charset="0"/>
+                <a:cs typeface="Arial" charset="0"/>
+              </a:defRPr>
+            </a:lvl4pPr>
+            <a:lvl5pPr marL="2057400" indent="-228600" eaLnBrk="0" hangingPunct="0">
+              <a:spcBef>
+                <a:spcPct val="20000"/>
+              </a:spcBef>
+              <a:buChar char="»"/>
+              <a:defRPr sz="2000">
+                <a:solidFill>
+                  <a:schemeClr val="tx1"/>
+                </a:solidFill>
+                <a:latin typeface="Arial" charset="0"/>
+                <a:cs typeface="Arial" charset="0"/>
+              </a:defRPr>
+            </a:lvl5pPr>
+            <a:lvl6pPr marL="2514600" indent="-228600" eaLnBrk="0" fontAlgn="base" hangingPunct="0">
+              <a:spcBef>
+                <a:spcPct val="20000"/>
+              </a:spcBef>
+              <a:spcAft>
+                <a:spcPct val="0"/>
+              </a:spcAft>
+              <a:buChar char="»"/>
+              <a:defRPr sz="2000">
+                <a:solidFill>
+                  <a:schemeClr val="tx1"/>
+                </a:solidFill>
+                <a:latin typeface="Arial" charset="0"/>
+                <a:cs typeface="Arial" charset="0"/>
+              </a:defRPr>
+            </a:lvl6pPr>
+            <a:lvl7pPr marL="2971800" indent="-228600" eaLnBrk="0" fontAlgn="base" hangingPunct="0">
+              <a:spcBef>
+                <a:spcPct val="20000"/>
+              </a:spcBef>
+              <a:spcAft>
+                <a:spcPct val="0"/>
+              </a:spcAft>
+              <a:buChar char="»"/>
+              <a:defRPr sz="2000">
+                <a:solidFill>
+                  <a:schemeClr val="tx1"/>
+                </a:solidFill>
+                <a:latin typeface="Arial" charset="0"/>
+                <a:cs typeface="Arial" charset="0"/>
+              </a:defRPr>
+            </a:lvl7pPr>
+            <a:lvl8pPr marL="3429000" indent="-228600" eaLnBrk="0" fontAlgn="base" hangingPunct="0">
+              <a:spcBef>
+                <a:spcPct val="20000"/>
+              </a:spcBef>
+              <a:spcAft>
+                <a:spcPct val="0"/>
+              </a:spcAft>
+              <a:buChar char="»"/>
+              <a:defRPr sz="2000">
+                <a:solidFill>
+                  <a:schemeClr val="tx1"/>
+                </a:solidFill>
+                <a:latin typeface="Arial" charset="0"/>
+                <a:cs typeface="Arial" charset="0"/>
+              </a:defRPr>
+            </a:lvl8pPr>
+            <a:lvl9pPr marL="3886200" indent="-228600" eaLnBrk="0" fontAlgn="base" hangingPunct="0">
+              <a:spcBef>
+                <a:spcPct val="20000"/>
+              </a:spcBef>
+              <a:spcAft>
+                <a:spcPct val="0"/>
+              </a:spcAft>
+              <a:buChar char="»"/>
+              <a:defRPr sz="2000">
+                <a:solidFill>
+                  <a:schemeClr val="tx1"/>
+                </a:solidFill>
+                <a:latin typeface="Arial" charset="0"/>
+                <a:cs typeface="Arial" charset="0"/>
+              </a:defRPr>
+            </a:lvl9pPr>
+          </a:lstStyle>
+          <a:p>
+            <a:pPr eaLnBrk="1" hangingPunct="1">
+              <a:spcBef>
+                <a:spcPct val="0"/>
+              </a:spcBef>
+              <a:buFontTx/>
+              <a:buNone/>
+            </a:pPr>
+            <a:r>
+              <a:rPr lang="en-GB" altLang="en-US" sz="1400" dirty="0">
+                <a:solidFill>
+                  <a:srgbClr val="C9C9D9"/>
+                </a:solidFill>
+                <a:latin typeface="FoundrySterling-Medium" panose="00000500000000000000" pitchFamily="2" charset="0"/>
+              </a:rPr>
+              <a:t>Mathematical Institute</a:t>
+            </a:r>
+          </a:p>
+        </p:txBody>
+      </p:sp>
+      <p:sp>
+        <p:nvSpPr>
+          <p:cNvPr id="15" name="Text Box 12"/>
+          <p:cNvSpPr txBox="1">
+            <a:spLocks noChangeArrowheads="1"/>
+          </p:cNvSpPr>
+          <p:nvPr/>
+        </p:nvSpPr>
+        <p:spPr bwMode="auto">
+          <a:xfrm>
+            <a:off x="3899786" y="6481273"/>
+            <a:ext cx="2101666" cy="338554"/>
+          </a:xfrm>
+          <a:prstGeom prst="rect">
+            <a:avLst/>
+          </a:prstGeom>
+          <a:noFill/>
+          <a:ln>
+            <a:noFill/>
+          </a:ln>
+          <a:extLst>
+            <a:ext uri="{909E8E84-426E-40DD-AFC4-6F175D3DCCD1}">
+              <a14:hiddenFill xmlns:a14="http://schemas.microsoft.com/office/drawing/2010/main">
+                <a:solidFill>
+                  <a:srgbClr val="FFFFFF"/>
+                </a:solidFill>
+              </a14:hiddenFill>
+            </a:ext>
+            <a:ext uri="{91240B29-F687-4F45-9708-019B960494DF}">
+              <a14:hiddenLine xmlns:a14="http://schemas.microsoft.com/office/drawing/2010/main" w="9525">
+                <a:solidFill>
+                  <a:srgbClr val="000000"/>
+                </a:solidFill>
+                <a:miter lim="800000"/>
+                <a:headEnd/>
+                <a:tailEnd/>
+              </a14:hiddenLine>
+            </a:ext>
+          </a:extLst>
+        </p:spPr>
+        <p:txBody>
+          <a:bodyPr wrap="none">
+            <a:noAutofit/>
+          </a:bodyPr>
+          <a:lstStyle>
+            <a:lvl1pPr eaLnBrk="0" hangingPunct="0">
+              <a:spcBef>
+                <a:spcPct val="20000"/>
+              </a:spcBef>
+              <a:buChar char="•"/>
+              <a:defRPr sz="3200">
+                <a:solidFill>
+                  <a:schemeClr val="tx1"/>
+                </a:solidFill>
+                <a:latin typeface="Arial" charset="0"/>
+                <a:cs typeface="Arial" charset="0"/>
+              </a:defRPr>
+            </a:lvl1pPr>
+            <a:lvl2pPr marL="742950" indent="-285750" eaLnBrk="0" hangingPunct="0">
+              <a:spcBef>
+                <a:spcPct val="20000"/>
+              </a:spcBef>
+              <a:buChar char="–"/>
+              <a:defRPr sz="2800">
+                <a:solidFill>
+                  <a:schemeClr val="tx1"/>
+                </a:solidFill>
+                <a:latin typeface="Arial" charset="0"/>
+                <a:cs typeface="Arial" charset="0"/>
+              </a:defRPr>
+            </a:lvl2pPr>
+            <a:lvl3pPr marL="1143000" indent="-228600" eaLnBrk="0" hangingPunct="0">
+              <a:spcBef>
+                <a:spcPct val="20000"/>
+              </a:spcBef>
+              <a:buChar char="•"/>
+              <a:defRPr sz="2400">
+                <a:solidFill>
+                  <a:schemeClr val="tx1"/>
+                </a:solidFill>
+                <a:latin typeface="Arial" charset="0"/>
+                <a:cs typeface="Arial" charset="0"/>
+              </a:defRPr>
+            </a:lvl3pPr>
+            <a:lvl4pPr marL="1600200" indent="-228600" eaLnBrk="0" hangingPunct="0">
+              <a:spcBef>
+                <a:spcPct val="20000"/>
+              </a:spcBef>
+              <a:buChar char="–"/>
+              <a:defRPr sz="2000">
+                <a:solidFill>
+                  <a:schemeClr val="tx1"/>
+                </a:solidFill>
+                <a:latin typeface="Arial" charset="0"/>
+                <a:cs typeface="Arial" charset="0"/>
+              </a:defRPr>
+            </a:lvl4pPr>
+            <a:lvl5pPr marL="2057400" indent="-228600" eaLnBrk="0" hangingPunct="0">
+              <a:spcBef>
+                <a:spcPct val="20000"/>
+              </a:spcBef>
+              <a:buChar char="»"/>
+              <a:defRPr sz="2000">
+                <a:solidFill>
+                  <a:schemeClr val="tx1"/>
+                </a:solidFill>
+                <a:latin typeface="Arial" charset="0"/>
+                <a:cs typeface="Arial" charset="0"/>
+              </a:defRPr>
+            </a:lvl5pPr>
+            <a:lvl6pPr marL="2514600" indent="-228600" eaLnBrk="0" fontAlgn="base" hangingPunct="0">
+              <a:spcBef>
+                <a:spcPct val="20000"/>
+              </a:spcBef>
+              <a:spcAft>
+                <a:spcPct val="0"/>
+              </a:spcAft>
+              <a:buChar char="»"/>
+              <a:defRPr sz="2000">
+                <a:solidFill>
+                  <a:schemeClr val="tx1"/>
+                </a:solidFill>
+                <a:latin typeface="Arial" charset="0"/>
+                <a:cs typeface="Arial" charset="0"/>
+              </a:defRPr>
+            </a:lvl6pPr>
+            <a:lvl7pPr marL="2971800" indent="-228600" eaLnBrk="0" fontAlgn="base" hangingPunct="0">
+              <a:spcBef>
+                <a:spcPct val="20000"/>
+              </a:spcBef>
+              <a:spcAft>
+                <a:spcPct val="0"/>
+              </a:spcAft>
+              <a:buChar char="»"/>
+              <a:defRPr sz="2000">
+                <a:solidFill>
+                  <a:schemeClr val="tx1"/>
+                </a:solidFill>
+                <a:latin typeface="Arial" charset="0"/>
+                <a:cs typeface="Arial" charset="0"/>
+              </a:defRPr>
+            </a:lvl7pPr>
+            <a:lvl8pPr marL="3429000" indent="-228600" eaLnBrk="0" fontAlgn="base" hangingPunct="0">
+              <a:spcBef>
+                <a:spcPct val="20000"/>
+              </a:spcBef>
+              <a:spcAft>
+                <a:spcPct val="0"/>
+              </a:spcAft>
+              <a:buChar char="»"/>
+              <a:defRPr sz="2000">
+                <a:solidFill>
+                  <a:schemeClr val="tx1"/>
+                </a:solidFill>
+                <a:latin typeface="Arial" charset="0"/>
+                <a:cs typeface="Arial" charset="0"/>
+              </a:defRPr>
+            </a:lvl8pPr>
+            <a:lvl9pPr marL="3886200" indent="-228600" eaLnBrk="0" fontAlgn="base" hangingPunct="0">
+              <a:spcBef>
+                <a:spcPct val="20000"/>
+              </a:spcBef>
+              <a:spcAft>
+                <a:spcPct val="0"/>
+              </a:spcAft>
+              <a:buChar char="»"/>
+              <a:defRPr sz="2000">
+                <a:solidFill>
+                  <a:schemeClr val="tx1"/>
+                </a:solidFill>
+                <a:latin typeface="Arial" charset="0"/>
+                <a:cs typeface="Arial" charset="0"/>
+              </a:defRPr>
+            </a:lvl9pPr>
+          </a:lstStyle>
+          <a:p>
+            <a:pPr algn="ctr" eaLnBrk="1" hangingPunct="1">
+              <a:spcBef>
+                <a:spcPct val="0"/>
+              </a:spcBef>
+              <a:buFontTx/>
+              <a:buNone/>
+            </a:pPr>
+            <a:r>
+              <a:rPr lang="en-GB" altLang="en-US" sz="1100" b="1" dirty="0">
+                <a:solidFill>
+                  <a:srgbClr val="002147"/>
+                </a:solidFill>
+                <a:latin typeface="FoundrySterling-Medium" panose="00000500000000000000" pitchFamily="2" charset="0"/>
+              </a:rPr>
+              <a:t>EPSRC Centre for Doctoral Training in Industrially Focused Mathematical Modelling</a:t>
+            </a:r>
+          </a:p>
+        </p:txBody>
+      </p:sp>
+      <p:pic>
+        <p:nvPicPr>
+          <p:cNvPr id="25" name="Picture 24"/>
+          <p:cNvPicPr>
+            <a:picLocks noChangeAspect="1"/>
+          </p:cNvPicPr>
+          <p:nvPr>
+            <p:custDataLst>
+              <p:tags r:id="rId1"/>
+            </p:custDataLst>
+          </p:nvPr>
+        </p:nvPicPr>
+        <p:blipFill>
+          <a:blip r:embed="rId6" cstate="print">
+            <a:extLst>
+              <a:ext uri="{28A0092B-C50C-407E-A947-70E740481C1C}">
+                <a14:useLocalDpi xmlns:a14="http://schemas.microsoft.com/office/drawing/2010/main" val="0"/>
+              </a:ext>
+            </a:extLst>
+          </a:blip>
+          <a:stretch>
+            <a:fillRect/>
+          </a:stretch>
+        </p:blipFill>
+        <p:spPr>
+          <a:xfrm>
+            <a:off x="1298971" y="2240799"/>
+            <a:ext cx="6962876" cy="2066047"/>
+          </a:xfrm>
+          <a:prstGeom prst="rect">
+            <a:avLst/>
+          </a:prstGeom>
+        </p:spPr>
+      </p:pic>
+      <p:pic>
+        <p:nvPicPr>
+          <p:cNvPr id="18" name="Picture 17"/>
+          <p:cNvPicPr>
+            <a:picLocks noChangeAspect="1"/>
+          </p:cNvPicPr>
+          <p:nvPr>
+            <p:custDataLst>
+              <p:tags r:id="rId2"/>
+            </p:custDataLst>
+          </p:nvPr>
+        </p:nvPicPr>
+        <p:blipFill>
+          <a:blip r:embed="rId7" cstate="print">
+            <a:extLst>
+              <a:ext uri="{28A0092B-C50C-407E-A947-70E740481C1C}">
+                <a14:useLocalDpi xmlns:a14="http://schemas.microsoft.com/office/drawing/2010/main" val="0"/>
+              </a:ext>
+            </a:extLst>
+          </a:blip>
+          <a:stretch>
+            <a:fillRect/>
+          </a:stretch>
+        </p:blipFill>
+        <p:spPr>
+          <a:xfrm>
+            <a:off x="1298971" y="1359691"/>
+            <a:ext cx="7416827" cy="502145"/>
+          </a:xfrm>
+          <a:prstGeom prst="rect">
+            <a:avLst/>
+          </a:prstGeom>
+        </p:spPr>
+      </p:pic>
+      <p:pic>
+        <p:nvPicPr>
+          <p:cNvPr id="27" name="Picture 26"/>
+          <p:cNvPicPr>
+            <a:picLocks noChangeAspect="1"/>
+          </p:cNvPicPr>
+          <p:nvPr>
+            <p:custDataLst>
+              <p:tags r:id="rId3"/>
+            </p:custDataLst>
+          </p:nvPr>
+        </p:nvPicPr>
+        <p:blipFill>
+          <a:blip r:embed="rId8" cstate="print">
+            <a:extLst>
+              <a:ext uri="{28A0092B-C50C-407E-A947-70E740481C1C}">
+                <a14:useLocalDpi xmlns:a14="http://schemas.microsoft.com/office/drawing/2010/main" val="0"/>
+              </a:ext>
+            </a:extLst>
+          </a:blip>
+          <a:stretch>
+            <a:fillRect/>
+          </a:stretch>
+        </p:blipFill>
+        <p:spPr>
+          <a:xfrm>
+            <a:off x="1448704" y="4762929"/>
+            <a:ext cx="6813143" cy="961020"/>
+          </a:xfrm>
+          <a:prstGeom prst="rect">
+            <a:avLst/>
+          </a:prstGeom>
+        </p:spPr>
+      </p:pic>
+    </p:spTree>
+    <p:extLst>
+      <p:ext uri="{BB962C8B-B14F-4D97-AF65-F5344CB8AC3E}">
+        <p14:creationId xmlns:p14="http://schemas.microsoft.com/office/powerpoint/2010/main" val="1712294847"/>
+      </p:ext>
+    </p:extLst>
+  </p:cSld>
+  <p:clrMapOvr>
+    <a:masterClrMapping/>
+  </p:clrMapOvr>
+  <p:timing>
+    <p:tnLst>
+      <p:par>
+        <p:cTn id="1" dur="indefinite" restart="never" nodeType="tmRoot"/>
+      </p:par>
+    </p:tnLst>
+  </p:timing>
 </p:sld>
 </file>
 
 <file path=ppt/tags/tag1.xml><?xml version="1.0" encoding="utf-8"?>
 <p:tagLst xmlns:a="http://schemas.openxmlformats.org/drawingml/2006/main" xmlns:r="http://schemas.openxmlformats.org/officeDocument/2006/relationships" xmlns:p="http://schemas.openxmlformats.org/presentationml/2006/main">
   <p:tag name="OUTPUTDPI" val="1200"/>
-  <p:tag name="ORIGINALHEIGHT" val="896,8879"/>
-  <p:tag name="ORIGINALWIDTH" val="3232,096"/>
-  <p:tag name="LATEXADDIN" val="\documentclass{article}&#10;\usepackage{amsmath}&#10;\pagestyle{empty}&#10;\begin{document}&#10;&#10;$$&#10;\begin{aligned}&#10; \begin{cases}&#10;\gamma \frac{\partial v}{\partial t}(\mathbf{x},t) - \text{div}(\alpha(\mathbf{x}) \nabla v (\mathbf{x},t)) &amp;= 0 \quad \text{in} \ &#10;\Omega \times [0,T] \\ \\&#10;-\alpha(\mathbf{x}) \nabla v(\mathbf{x},t) \cdot n(\mathbf{x}) &amp;= \beta v(\mathbf{x},t) \quad \text{on} \ \partial \Omega \times [0,T] \\ \\&#10;v(\mathbf{x},0) &amp;= v_0(\mathbf{x}) \quad \text{in} \ \Omega&#10;\end{cases} &#10;\end{aligned} $$&#10;&#10;&#10;&#10;&#10;\end{document}"/>
+  <p:tag name="ORIGINALHEIGHT" val="896.8879"/>
+  <p:tag name="ORIGINALWIDTH" val="3232.096"/>
+  <p:tag name="LATEXADDIN" val="\documentclass{article}&#10;\usepackage{amsmath}&#10;\pagestyle{empty}&#10;\begin{document}&#10;&#10;$$&#10;\begin{aligned}&#10; \begin{cases}&#10;\gamma \frac{\partial v}{\partial t}(\mathbf{x},t) - \text{div}(\alpha(\mathbf{x}) \nabla v (\mathbf{x},t)) &amp;= 0 \quad \quad \quad \ \ \text{in} \ &#10;\Omega \times [0,T] \\ \\&#10;-\alpha(\mathbf{x}) \nabla v(\mathbf{x},t) \cdot n(\mathbf{x}) &amp;= \beta v(\mathbf{x},t) \quad \text{on} \ \partial \Omega \times [0,T] \\ \\&#10;v(\mathbf{x},0) &amp;= v_0(\mathbf{x}) \quad \quad \text{in} \ \Omega&#10;\end{cases} &#10;\end{aligned} $$&#10;&#10;&#10;&#10;&#10;\end{document}"/>
   <p:tag name="IGUANATEXSIZE" val="20"/>
-  <p:tag name="IGUANATEXCURSOR" val="447"/>
-  <p:tag name="TRANSPARENCY" val="Wahr"/>
+  <p:tag name="IGUANATEXCURSOR" val="250"/>
+  <p:tag name="TRANSPARENCY" val="True"/>
   <p:tag name="FILENAME" val=""/>
   <p:tag name="LATEXENGINEID" val="0"/>
-  <p:tag name="TEMPFOLDER" val="c:\temp\"/>
+  <p:tag name="TEMPFOLDER" val="C:\Users\Administrator\Documents\iguanate_temp\"/>
   <p:tag name="LATEXFORMHEIGHT" val="312"/>
   <p:tag name="LATEXFORMWIDTH" val="384"/>
-  <p:tag name="LATEXFORMWRAP" val="Wahr"/>
+  <p:tag name="LATEXFORMWRAP" val="True"/>
   <p:tag name="BITMAPVECTOR" val="0"/>
 </p:tagLst>
 </file>
@@ -13865,18 +15429,18 @@
 <file path=ppt/tags/tag10.xml><?xml version="1.0" encoding="utf-8"?>
 <p:tagLst xmlns:a="http://schemas.openxmlformats.org/drawingml/2006/main" xmlns:r="http://schemas.openxmlformats.org/officeDocument/2006/relationships" xmlns:p="http://schemas.openxmlformats.org/presentationml/2006/main">
   <p:tag name="OUTPUTDPI" val="1200"/>
-  <p:tag name="ORIGINALHEIGHT" val="2364,455"/>
-  <p:tag name="ORIGINALWIDTH" val="4164,229"/>
-  <p:tag name="LATEXADDIN" val="\documentclass{article}&#10;\usepackage{amsmath, amssymb}&#10;\pagestyle{empty}&#10;\begin{document}&#10;&#10;\begin{itemize}&#10;&#10;\item We then use a \textbf{finite difference scheme} based on the following approximations of the derivative of a differentiable function $f \in C^{1}(D)$.&#10;&#10;\item Forward difference quotient (used for time points $t$): $$f^{\prime}(x) = \frac{f(x+h)-f(x)}{h} + O(h). $$&#10;&#10;\item Centered difference quotient (used for inner spatial points $\mathbf{x} = (x,y)$):&#10;$$f^{\prime}(x) = \frac{f(x+h)-f(x-h)}{2h} + O(h^2). $$&#10;&#10;\item Second-order one-sided difference quotient (used for spatial boundary points $\mathbf{x} = (x,y)$):&#10;$$\frac{-3f(x) + 4f(x+h) - f(x+2h)}{2h}. $$&#10;&#10;&#10;&#10;&#10;\end{itemize}&#10;&#10;\end{document}"/>
+  <p:tag name="ORIGINALHEIGHT" val="2715.41"/>
+  <p:tag name="ORIGINALWIDTH" val="4164.229"/>
+  <p:tag name="LATEXADDIN" val="\documentclass{article}&#10;\usepackage{amsmath, amssymb}&#10;\pagestyle{empty}&#10;\begin{document}&#10;&#10;\begin{itemize}&#10;&#10;\item We then use a \textbf{finite difference scheme} based on the following approximations of the derivative of a differentiable function $f \in C^{1}(D)$.&#10;&#10;\item Forward difference quotient (used for time points $t$): $$f^{\prime}(x) = \frac{f(x+h)-f(x)}{h} + O(h). $$&#10;&#10;\item Centered difference quotients (used for inner spatial points $\mathbf{x} = (x,y)$):&#10;$$f^{\prime}(x) = \frac{f(x+h)-f(x-h)}{2h} + O(h^2). $$&#10;$$ f^{\prime \prime}(x) = \frac{f(x+h)-2f(x)+f(x-h)}{h^2} + O(h^2) $$&#10;&#10;\item Second-order one-sided difference quotient (used for spatial boundary points $\mathbf{x} = (x,y)$):&#10;$$\frac{-3f(x) + 4f(x+h) - f(x+2h)}{2h}. $$&#10;&#10;&#10;&#10;&#10;&#10;&#10;\end{itemize}&#10;&#10;\end{document}"/>
   <p:tag name="IGUANATEXSIZE" val="20"/>
-  <p:tag name="IGUANATEXCURSOR" val="105"/>
-  <p:tag name="TRANSPARENCY" val="Wahr"/>
+  <p:tag name="IGUANATEXCURSOR" val="575"/>
+  <p:tag name="TRANSPARENCY" val="True"/>
   <p:tag name="FILENAME" val=""/>
   <p:tag name="LATEXENGINEID" val="0"/>
-  <p:tag name="TEMPFOLDER" val="c:\temp\"/>
+  <p:tag name="TEMPFOLDER" val="C:\Users\Administrator\Documents\iguanate_temp\"/>
   <p:tag name="LATEXFORMHEIGHT" val="312"/>
   <p:tag name="LATEXFORMWIDTH" val="384"/>
-  <p:tag name="LATEXFORMWRAP" val="Wahr"/>
+  <p:tag name="LATEXFORMWRAP" val="True"/>
   <p:tag name="BITMAPVECTOR" val="0"/>
 </p:tagLst>
 </file>
@@ -13884,18 +15448,18 @@
 <file path=ppt/tags/tag11.xml><?xml version="1.0" encoding="utf-8"?>
 <p:tagLst xmlns:a="http://schemas.openxmlformats.org/drawingml/2006/main" xmlns:r="http://schemas.openxmlformats.org/officeDocument/2006/relationships" xmlns:p="http://schemas.openxmlformats.org/presentationml/2006/main">
   <p:tag name="OUTPUTDPI" val="1200"/>
-  <p:tag name="ORIGINALHEIGHT" val="1256,843"/>
-  <p:tag name="ORIGINALWIDTH" val="3630,296"/>
-  <p:tag name="LATEXADDIN" val="\documentclass{article}&#10;\usepackage{amsmath, amssymb}&#10;\pagestyle{empty}&#10;\begin{document}&#10;&#10;At interior spatial points:&#10;&#10;\begin{align*}&#10;v_{m,n}^{t+1} = v_{m,n}^{t} + \frac{2 \tau}{\gamma h^2} &amp;\Big[ \alpha_{m,n}^{t}(v_{m+1,n}^{t} + v_{m-1,n}^{t} -4v_{m,n}^{t} + v_{m,n-1}^{t})\Big]&#10;\\&#10;+ \frac{\tau}{2 \gamma h^2 } &amp;\Big[ (\alpha_{m+1,n}^{t} - \alpha_{m-1,n}^{t})(v_{m+1,n}^{t} - v_{m-1,n}^{t}) \Big]&#10;\\&#10; + \frac{\tau}{2 \gamma h^2 } &amp;\Big[ (\alpha_{m,n+1}^{t} - \alpha_{m,n-1}^{t})(v_{m,n+1}^{t} - v_{m,n-1}^{t})   \Big].&#10;\end{align*}&#10;&#10;&#10;&#10;&#10;\end{document}"/>
+  <p:tag name="ORIGINALHEIGHT" val="1229.846"/>
+  <p:tag name="ORIGINALWIDTH" val="3630.296"/>
+  <p:tag name="LATEXADDIN" val="\documentclass{article}&#10;\usepackage{amsmath, amssymb}&#10;\pagestyle{empty}&#10;\begin{document}&#10;&#10;At interior spatial points:&#10;&#10;\begin{align*}&#10;v_{m,n}^{t+1} = v_{m,n}^{t} + \frac{ \tau}{\gamma h^2} &amp;\Big[ \alpha_{m,n}^{t}(v_{m+1,n}^{t} + v_{m-1,n}^{t} -4v_{m,n}^{t} + v_{m,n-1}^{t})\Big]&#10;\\&#10;+ \frac{\tau}{4 \gamma h^2 } &amp;\Big[ (\alpha_{m+1,n}^{t} - \alpha_{m-1,n}^{t})(v_{m+1,n}^{t} - v_{m-1,n}^{t}) \Big]&#10;\\&#10; + \frac{\tau}{4 \gamma h^2 } &amp;\Big[ (\alpha_{m,n+1}^{t} - \alpha_{m,n-1}^{t})(v_{m,n+1}^{t} - v_{m,n-1}^{t})   \Big].&#10;\end{align*}&#10;&#10;&#10;&#10;&#10;\end{document}"/>
   <p:tag name="IGUANATEXSIZE" val="20"/>
-  <p:tag name="IGUANATEXCURSOR" val="519"/>
-  <p:tag name="TRANSPARENCY" val="Wahr"/>
+  <p:tag name="IGUANATEXCURSOR" val="170"/>
+  <p:tag name="TRANSPARENCY" val="True"/>
   <p:tag name="FILENAME" val=""/>
   <p:tag name="LATEXENGINEID" val="0"/>
-  <p:tag name="TEMPFOLDER" val="c:\temp\"/>
+  <p:tag name="TEMPFOLDER" val="C:\Users\Administrator\Documents\iguanate_temp\"/>
   <p:tag name="LATEXFORMHEIGHT" val="312"/>
   <p:tag name="LATEXFORMWIDTH" val="384"/>
-  <p:tag name="LATEXFORMWRAP" val="Wahr"/>
+  <p:tag name="LATEXFORMWRAP" val="True"/>
   <p:tag name="BITMAPVECTOR" val="0"/>
 </p:tagLst>
 </file>
@@ -13922,18 +15486,75 @@
 <file path=ppt/tags/tag13.xml><?xml version="1.0" encoding="utf-8"?>
 <p:tagLst xmlns:a="http://schemas.openxmlformats.org/drawingml/2006/main" xmlns:r="http://schemas.openxmlformats.org/officeDocument/2006/relationships" xmlns:p="http://schemas.openxmlformats.org/presentationml/2006/main">
   <p:tag name="OUTPUTDPI" val="1200"/>
-  <p:tag name="ORIGINALHEIGHT" val="907,3865"/>
-  <p:tag name="ORIGINALWIDTH" val="2407,949"/>
-  <p:tag name="LATEXADDIN" val="\documentclass{article}&#10;\usepackage{amsmath, amssymb}&#10;\pagestyle{empty}&#10;\begin{document}&#10;&#10;\begin{itemize}&#10;&#10;\item We first implemented our scheme in \newline approximately $150$ lines of \textbf{Python}.&#10;&#10;\item To speed things up, we also implemented \newline the scheme in \textbf{Julia}.&#10;&#10;\item We also experimented a bit with \textbf{Matlab}.&#10;&#10;\end{itemize}&#10;&#10;\end{document}"/>
+  <p:tag name="ORIGINALHEIGHT" val="908.1365"/>
+  <p:tag name="ORIGINALWIDTH" val="2586.427"/>
+  <p:tag name="LATEXADDIN" val="\documentclass{article}&#10;\usepackage{amsmath, amssymb}&#10;\pagestyle{empty}&#10;\begin{document}&#10;&#10;\begin{itemize}&#10;&#10;\item We first implemented our scheme in \newline approximately $150$ lines of \textbf{Python}.&#10;&#10;\item To speed things up, we also implemented \newline the scheme in \textbf{Julia}.&#10;&#10;\item We also experimented a bit with \textbf{MATLAB}.&#10;&#10;\end{itemize}&#10;&#10;\end{document}"/>
   <p:tag name="IGUANATEXSIZE" val="20"/>
-  <p:tag name="IGUANATEXCURSOR" val="343"/>
-  <p:tag name="TRANSPARENCY" val="Wahr"/>
+  <p:tag name="IGUANATEXCURSOR" val="342"/>
+  <p:tag name="TRANSPARENCY" val="True"/>
   <p:tag name="FILENAME" val=""/>
   <p:tag name="LATEXENGINEID" val="0"/>
-  <p:tag name="TEMPFOLDER" val="c:\temp\"/>
+  <p:tag name="TEMPFOLDER" val="C:\Users\Administrator\Documents\iguanate_temp\"/>
   <p:tag name="LATEXFORMHEIGHT" val="312"/>
   <p:tag name="LATEXFORMWIDTH" val="384"/>
-  <p:tag name="LATEXFORMWRAP" val="Wahr"/>
+  <p:tag name="LATEXFORMWRAP" val="True"/>
+  <p:tag name="BITMAPVECTOR" val="0"/>
+</p:tagLst>
+</file>
+
+<file path=ppt/tags/tag14.xml><?xml version="1.0" encoding="utf-8"?>
+<p:tagLst xmlns:a="http://schemas.openxmlformats.org/drawingml/2006/main" xmlns:r="http://schemas.openxmlformats.org/officeDocument/2006/relationships" xmlns:p="http://schemas.openxmlformats.org/presentationml/2006/main">
+  <p:tag name="OUTPUTDPI" val="1200"/>
+  <p:tag name="ORIGINALHEIGHT" val="896.8879"/>
+  <p:tag name="ORIGINALWIDTH" val="3053.618"/>
+  <p:tag name="LATEXADDIN" val="\documentclass{article}&#10;\usepackage{amsmath}&#10;\pagestyle{empty}&#10;\begin{document}&#10;&#10;$$&#10;\begin{aligned}&#10; \begin{cases}&#10;\frac{\partial v}{\partial t}(\mathbf{x},t) - \text{div}( \nabla v (\mathbf{x},t)) &amp;= 0 \quad \quad \quad \quad \quad \text{in} \ &#10;\Omega \times [0,T] \\ \\&#10;\nabla v(\mathbf{x},t) \cdot n(\mathbf{x}) &amp;= 0 \quad \quad \quad \quad \quad \text{on} \ \partial \Omega \times [0,T] \\ \\&#10;v((x,y),0) &amp;= x^2 + y^2 \quad \quad \ \text{in} \ \Omega&#10;\end{cases} &#10;\end{aligned} $$&#10;&#10;&#10;&#10;&#10;\end{document}"/>
+  <p:tag name="IGUANATEXSIZE" val="20"/>
+  <p:tag name="IGUANATEXCURSOR" val="350"/>
+  <p:tag name="TRANSPARENCY" val="True"/>
+  <p:tag name="FILENAME" val=""/>
+  <p:tag name="LATEXENGINEID" val="0"/>
+  <p:tag name="TEMPFOLDER" val="C:\Users\Administrator\Documents\iguanate_temp\"/>
+  <p:tag name="LATEXFORMHEIGHT" val="312"/>
+  <p:tag name="LATEXFORMWIDTH" val="384"/>
+  <p:tag name="LATEXFORMWRAP" val="True"/>
+  <p:tag name="BITMAPVECTOR" val="0"/>
+</p:tagLst>
+</file>
+
+<file path=ppt/tags/tag15.xml><?xml version="1.0" encoding="utf-8"?>
+<p:tagLst xmlns:a="http://schemas.openxmlformats.org/drawingml/2006/main" xmlns:r="http://schemas.openxmlformats.org/officeDocument/2006/relationships" xmlns:p="http://schemas.openxmlformats.org/presentationml/2006/main">
+  <p:tag name="OUTPUTDPI" val="1200"/>
+  <p:tag name="ORIGINALHEIGHT" val="277.4653"/>
+  <p:tag name="ORIGINALWIDTH" val="4098.237"/>
+  <p:tag name="LATEXADDIN" val="\documentclass{article}&#10;\usepackage{amsmath}&#10;\pagestyle{empty}&#10;\begin{document}&#10;&#10;\begin{itemize}&#10;&#10;\item For $\beta = 0$, $\gamma = 1$, $\alpha(x,y) = 1$ and $v_0(x,y) = x^2 + y^2$, we arrive at the following system:&#10;&#10;&#10;\end{itemize}&#10;&#10;&#10;\end{document}"/>
+  <p:tag name="IGUANATEXSIZE" val="20"/>
+  <p:tag name="IGUANATEXCURSOR" val="133"/>
+  <p:tag name="TRANSPARENCY" val="True"/>
+  <p:tag name="FILENAME" val=""/>
+  <p:tag name="LATEXENGINEID" val="0"/>
+  <p:tag name="TEMPFOLDER" val="C:\Users\Administrator\Documents\iguanate_temp\"/>
+  <p:tag name="LATEXFORMHEIGHT" val="312"/>
+  <p:tag name="LATEXFORMWIDTH" val="384"/>
+  <p:tag name="LATEXFORMWRAP" val="True"/>
+  <p:tag name="BITMAPVECTOR" val="0"/>
+</p:tagLst>
+</file>
+
+<file path=ppt/tags/tag16.xml><?xml version="1.0" encoding="utf-8"?>
+<p:tagLst xmlns:a="http://schemas.openxmlformats.org/drawingml/2006/main" xmlns:r="http://schemas.openxmlformats.org/officeDocument/2006/relationships" xmlns:p="http://schemas.openxmlformats.org/presentationml/2006/main">
+  <p:tag name="OUTPUTDPI" val="1200"/>
+  <p:tag name="ORIGINALHEIGHT" val="578.1777"/>
+  <p:tag name="ORIGINALWIDTH" val="4098.988"/>
+  <p:tag name="LATEXADDIN" val="\documentclass{article}&#10;\usepackage{amsmath}&#10;\pagestyle{empty}&#10;\begin{document}&#10;&#10;\begin{itemize}&#10;&#10;\item The boundaries are perfectly isolating, so the solution must converge to the average value&#10;$$ \int_{[0,1]^2} x^2 + y^2 d(x,y) = \frac{2}{3} . $$&#10;&#10;\end{itemize}&#10;&#10;&#10;&#10;\end{document}"/>
+  <p:tag name="IGUANATEXSIZE" val="20"/>
+  <p:tag name="IGUANATEXCURSOR" val="242"/>
+  <p:tag name="TRANSPARENCY" val="True"/>
+  <p:tag name="FILENAME" val=""/>
+  <p:tag name="LATEXENGINEID" val="0"/>
+  <p:tag name="TEMPFOLDER" val="C:\Users\Administrator\Documents\iguanate_temp\"/>
+  <p:tag name="LATEXFORMHEIGHT" val="312"/>
+  <p:tag name="LATEXFORMWIDTH" val="384"/>
+  <p:tag name="LATEXFORMWRAP" val="True"/>
   <p:tag name="BITMAPVECTOR" val="0"/>
 </p:tagLst>
 </file>

</xml_diff>